<commit_message>
Good XTable Creation #3
</commit_message>
<xml_diff>
--- a/FinalPresentation_layne.pptx
+++ b/FinalPresentation_layne.pptx
@@ -10,6 +10,7 @@
     <p:sldId id="260" r:id="rId4"/>
     <p:sldId id="258" r:id="rId5"/>
     <p:sldId id="259" r:id="rId6"/>
+    <p:sldId id="261" r:id="rId7"/>
   </p:sldIdLst>
   <p:sldSz cx="12192000" cy="6858000"/>
   <p:notesSz cx="6858000" cy="9144000"/>
@@ -3006,7 +3007,18 @@
           <a:bodyPr/>
           <a:lstStyle/>
           <a:p>
-            <a:endParaRPr lang="en-US" dirty="0"/>
+            <a:pPr algn="r"/>
+            <a:r>
+              <a:rPr lang="en-US" dirty="0" smtClean="0"/>
+              <a:t>Steven Layne</a:t>
+            </a:r>
+          </a:p>
+          <a:p>
+            <a:pPr algn="r"/>
+            <a:r>
+              <a:rPr lang="en-US" dirty="0" smtClean="0"/>
+              <a:t>Manatee Enthusiast</a:t>
+            </a:r>
           </a:p>
         </p:txBody>
       </p:sp>
@@ -3020,6 +3032,13 @@
   <p:clrMapOvr>
     <a:masterClrMapping/>
   </p:clrMapOvr>
+  <p:timing>
+    <p:tnLst>
+      <p:par>
+        <p:cTn id="1" dur="indefinite" restart="never" nodeType="tmRoot"/>
+      </p:par>
+    </p:tnLst>
+  </p:timing>
 </p:sld>
 </file>
 
@@ -3099,6 +3118,13 @@
   <p:clrMapOvr>
     <a:masterClrMapping/>
   </p:clrMapOvr>
+  <p:timing>
+    <p:tnLst>
+      <p:par>
+        <p:cTn id="1" dur="indefinite" restart="never" nodeType="tmRoot"/>
+      </p:par>
+    </p:tnLst>
+  </p:timing>
 </p:sld>
 </file>
 
@@ -3187,6 +3213,13 @@
   <p:clrMapOvr>
     <a:masterClrMapping/>
   </p:clrMapOvr>
+  <p:timing>
+    <p:tnLst>
+      <p:par>
+        <p:cTn id="1" dur="indefinite" restart="never" nodeType="tmRoot"/>
+      </p:par>
+    </p:tnLst>
+  </p:timing>
 </p:sld>
 </file>
 
@@ -3618,7 +3651,7 @@
       </p:sp>
       <p:pic>
         <p:nvPicPr>
-          <p:cNvPr id="19" name="Picture 18"/>
+          <p:cNvPr id="24" name="Picture 23"/>
           <p:cNvPicPr>
             <a:picLocks noChangeAspect="1"/>
           </p:cNvPicPr>
@@ -3626,30 +3659,6 @@
         </p:nvPicPr>
         <p:blipFill>
           <a:blip r:embed="rId2"/>
-          <a:stretch>
-            <a:fillRect/>
-          </a:stretch>
-        </p:blipFill>
-        <p:spPr>
-          <a:xfrm>
-            <a:off x="9008367" y="837555"/>
-            <a:ext cx="3183631" cy="6020445"/>
-          </a:xfrm>
-          <a:prstGeom prst="rect">
-            <a:avLst/>
-          </a:prstGeom>
-        </p:spPr>
-      </p:pic>
-      <p:pic>
-        <p:nvPicPr>
-          <p:cNvPr id="24" name="Picture 23"/>
-          <p:cNvPicPr>
-            <a:picLocks noChangeAspect="1"/>
-          </p:cNvPicPr>
-          <p:nvPr/>
-        </p:nvPicPr>
-        <p:blipFill>
-          <a:blip r:embed="rId3"/>
           <a:stretch>
             <a:fillRect/>
           </a:stretch>
@@ -3664,10 +3673,156 @@
           </a:prstGeom>
         </p:spPr>
       </p:pic>
+      <p:pic>
+        <p:nvPicPr>
+          <p:cNvPr id="25" name="Picture 24"/>
+          <p:cNvPicPr>
+            <a:picLocks noChangeAspect="1"/>
+          </p:cNvPicPr>
+          <p:nvPr/>
+        </p:nvPicPr>
+        <p:blipFill>
+          <a:blip r:embed="rId3"/>
+          <a:stretch>
+            <a:fillRect/>
+          </a:stretch>
+        </p:blipFill>
+        <p:spPr>
+          <a:xfrm>
+            <a:off x="8827024" y="785446"/>
+            <a:ext cx="3391863" cy="6858000"/>
+          </a:xfrm>
+          <a:prstGeom prst="rect">
+            <a:avLst/>
+          </a:prstGeom>
+        </p:spPr>
+      </p:pic>
     </p:spTree>
     <p:extLst>
       <p:ext uri="{BB962C8B-B14F-4D97-AF65-F5344CB8AC3E}">
         <p14:creationId xmlns:p14="http://schemas.microsoft.com/office/powerpoint/2010/main" val="1007034445"/>
+      </p:ext>
+    </p:extLst>
+  </p:cSld>
+  <p:clrMapOvr>
+    <a:masterClrMapping/>
+  </p:clrMapOvr>
+  <p:timing>
+    <p:tnLst>
+      <p:par>
+        <p:cTn id="1" dur="indefinite" restart="never" nodeType="tmRoot"/>
+      </p:par>
+    </p:tnLst>
+  </p:timing>
+</p:sld>
+</file>
+
+<file path=ppt/slides/slide6.xml><?xml version="1.0" encoding="utf-8"?>
+<p:sld xmlns:a="http://schemas.openxmlformats.org/drawingml/2006/main" xmlns:r="http://schemas.openxmlformats.org/officeDocument/2006/relationships" xmlns:p="http://schemas.openxmlformats.org/presentationml/2006/main">
+  <p:cSld>
+    <p:spTree>
+      <p:nvGrpSpPr>
+        <p:cNvPr id="1" name=""/>
+        <p:cNvGrpSpPr/>
+        <p:nvPr/>
+      </p:nvGrpSpPr>
+      <p:grpSpPr>
+        <a:xfrm>
+          <a:off x="0" y="0"/>
+          <a:ext cx="0" cy="0"/>
+          <a:chOff x="0" y="0"/>
+          <a:chExt cx="0" cy="0"/>
+        </a:xfrm>
+      </p:grpSpPr>
+      <p:sp>
+        <p:nvSpPr>
+          <p:cNvPr id="4" name="Title 1"/>
+          <p:cNvSpPr>
+            <a:spLocks noGrp="1"/>
+          </p:cNvSpPr>
+          <p:nvPr>
+            <p:ph type="title"/>
+          </p:nvPr>
+        </p:nvSpPr>
+        <p:spPr>
+          <a:xfrm>
+            <a:off x="838199" y="-189679"/>
+            <a:ext cx="10515600" cy="1325563"/>
+          </a:xfrm>
+        </p:spPr>
+        <p:txBody>
+          <a:bodyPr/>
+          <a:lstStyle/>
+          <a:p>
+            <a:pPr algn="ctr"/>
+            <a:r>
+              <a:rPr lang="en-US" dirty="0" smtClean="0"/>
+              <a:t>Choosing Model(</a:t>
+            </a:r>
+            <a:r>
+              <a:rPr lang="en-US" dirty="0" err="1" smtClean="0"/>
+              <a:t>StepAIC</a:t>
+            </a:r>
+            <a:r>
+              <a:rPr lang="en-US" dirty="0" smtClean="0"/>
+              <a:t>)</a:t>
+            </a:r>
+            <a:endParaRPr lang="en-US" dirty="0"/>
+          </a:p>
+        </p:txBody>
+      </p:sp>
+      <p:pic>
+        <p:nvPicPr>
+          <p:cNvPr id="9" name="Picture 8"/>
+          <p:cNvPicPr>
+            <a:picLocks noChangeAspect="1"/>
+          </p:cNvPicPr>
+          <p:nvPr/>
+        </p:nvPicPr>
+        <p:blipFill>
+          <a:blip r:embed="rId2"/>
+          <a:stretch>
+            <a:fillRect/>
+          </a:stretch>
+        </p:blipFill>
+        <p:spPr>
+          <a:xfrm>
+            <a:off x="1638299" y="1533769"/>
+            <a:ext cx="8915400" cy="1422400"/>
+          </a:xfrm>
+          <a:prstGeom prst="rect">
+            <a:avLst/>
+          </a:prstGeom>
+        </p:spPr>
+      </p:pic>
+      <p:pic>
+        <p:nvPicPr>
+          <p:cNvPr id="10" name="Picture 9"/>
+          <p:cNvPicPr>
+            <a:picLocks noChangeAspect="1"/>
+          </p:cNvPicPr>
+          <p:nvPr/>
+        </p:nvPicPr>
+        <p:blipFill>
+          <a:blip r:embed="rId3"/>
+          <a:stretch>
+            <a:fillRect/>
+          </a:stretch>
+        </p:blipFill>
+        <p:spPr>
+          <a:xfrm>
+            <a:off x="1612899" y="4308286"/>
+            <a:ext cx="8940800" cy="1409700"/>
+          </a:xfrm>
+          <a:prstGeom prst="rect">
+            <a:avLst/>
+          </a:prstGeom>
+        </p:spPr>
+      </p:pic>
+    </p:spTree>
+    <p:extLst>
+      <p:ext uri="{BB962C8B-B14F-4D97-AF65-F5344CB8AC3E}">
+        <p14:creationId xmlns:p14="http://schemas.microsoft.com/office/powerpoint/2010/main" val="769159648"/>
       </p:ext>
     </p:extLst>
   </p:cSld>

</xml_diff>